<commit_message>
Renamed to class4.Rmd and homework4.Rmd
</commit_message>
<xml_diff>
--- a/doc/survival lecture 4.pptx
+++ b/doc/survival lecture 4.pptx
@@ -358,7 +358,7 @@
               <a:pPr>
                 <a:defRPr/>
               </a:pPr>
-              <a:t>5/19/2018</a:t>
+              <a:t>9/27/2018</a:t>
             </a:fld>
             <a:endParaRPr lang="en-US" altLang="en-US"/>
           </a:p>
@@ -666,7 +666,7 @@
               <a:pPr>
                 <a:defRPr/>
               </a:pPr>
-              <a:t>5/19/2018</a:t>
+              <a:t>9/27/2018</a:t>
             </a:fld>
             <a:endParaRPr lang="en-US" altLang="en-US"/>
           </a:p>
@@ -6382,8 +6382,13 @@
           <a:p>
             <a:r>
               <a:rPr lang="en-US" dirty="0"/>
-              <a:t>In this lecture, you'll work with more complex forms of the Cox model with multiple predictor variables. You'll include covariates in the Cox model to produce risk adjusted survival curves. You'll also assess the underlying assumptions of the Cox model, particularly the assumption of proportional hazards.</a:t>
-            </a:r>
+              <a:t>In this lecture, you'll work with more complex forms of the Cox model with multiple predictor variables. You'll include covariates in the Cox model to produce risk adjusted survival curves. You'll also assess the underlying assumptions of the Cox model, particularly the assumption of linear effects for your </a:t>
+            </a:r>
+            <a:r>
+              <a:rPr lang="en-US"/>
+              <a:t>independent variabless.</a:t>
+            </a:r>
+            <a:endParaRPr lang="en-US" dirty="0"/>
           </a:p>
         </p:txBody>
       </p:sp>

</xml_diff>